<commit_message>
fixed ANS logo font
</commit_message>
<xml_diff>
--- a/assets/logos_Funding/logos.pptx
+++ b/assets/logos_Funding/logos.pptx
@@ -260,7 +260,7 @@
           <a:p>
             <a:fld id="{63737C07-0EBF-4680-86B0-2C446B331173}" type="datetimeFigureOut">
               <a:rPr lang="de-DE" smtClean="0"/>
-              <a:t>04.07.2025</a:t>
+              <a:t>28.07.2025</a:t>
             </a:fld>
             <a:endParaRPr lang="de-DE"/>
           </a:p>
@@ -458,7 +458,7 @@
           <a:p>
             <a:fld id="{63737C07-0EBF-4680-86B0-2C446B331173}" type="datetimeFigureOut">
               <a:rPr lang="de-DE" smtClean="0"/>
-              <a:t>04.07.2025</a:t>
+              <a:t>28.07.2025</a:t>
             </a:fld>
             <a:endParaRPr lang="de-DE"/>
           </a:p>
@@ -666,7 +666,7 @@
           <a:p>
             <a:fld id="{63737C07-0EBF-4680-86B0-2C446B331173}" type="datetimeFigureOut">
               <a:rPr lang="de-DE" smtClean="0"/>
-              <a:t>04.07.2025</a:t>
+              <a:t>28.07.2025</a:t>
             </a:fld>
             <a:endParaRPr lang="de-DE"/>
           </a:p>
@@ -864,7 +864,7 @@
           <a:p>
             <a:fld id="{63737C07-0EBF-4680-86B0-2C446B331173}" type="datetimeFigureOut">
               <a:rPr lang="de-DE" smtClean="0"/>
-              <a:t>04.07.2025</a:t>
+              <a:t>28.07.2025</a:t>
             </a:fld>
             <a:endParaRPr lang="de-DE"/>
           </a:p>
@@ -1139,7 +1139,7 @@
           <a:p>
             <a:fld id="{63737C07-0EBF-4680-86B0-2C446B331173}" type="datetimeFigureOut">
               <a:rPr lang="de-DE" smtClean="0"/>
-              <a:t>04.07.2025</a:t>
+              <a:t>28.07.2025</a:t>
             </a:fld>
             <a:endParaRPr lang="de-DE"/>
           </a:p>
@@ -1404,7 +1404,7 @@
           <a:p>
             <a:fld id="{63737C07-0EBF-4680-86B0-2C446B331173}" type="datetimeFigureOut">
               <a:rPr lang="de-DE" smtClean="0"/>
-              <a:t>04.07.2025</a:t>
+              <a:t>28.07.2025</a:t>
             </a:fld>
             <a:endParaRPr lang="de-DE"/>
           </a:p>
@@ -1816,7 +1816,7 @@
           <a:p>
             <a:fld id="{63737C07-0EBF-4680-86B0-2C446B331173}" type="datetimeFigureOut">
               <a:rPr lang="de-DE" smtClean="0"/>
-              <a:t>04.07.2025</a:t>
+              <a:t>28.07.2025</a:t>
             </a:fld>
             <a:endParaRPr lang="de-DE"/>
           </a:p>
@@ -1957,7 +1957,7 @@
           <a:p>
             <a:fld id="{63737C07-0EBF-4680-86B0-2C446B331173}" type="datetimeFigureOut">
               <a:rPr lang="de-DE" smtClean="0"/>
-              <a:t>04.07.2025</a:t>
+              <a:t>28.07.2025</a:t>
             </a:fld>
             <a:endParaRPr lang="de-DE"/>
           </a:p>
@@ -2070,7 +2070,7 @@
           <a:p>
             <a:fld id="{63737C07-0EBF-4680-86B0-2C446B331173}" type="datetimeFigureOut">
               <a:rPr lang="de-DE" smtClean="0"/>
-              <a:t>04.07.2025</a:t>
+              <a:t>28.07.2025</a:t>
             </a:fld>
             <a:endParaRPr lang="de-DE"/>
           </a:p>
@@ -2381,7 +2381,7 @@
           <a:p>
             <a:fld id="{63737C07-0EBF-4680-86B0-2C446B331173}" type="datetimeFigureOut">
               <a:rPr lang="de-DE" smtClean="0"/>
-              <a:t>04.07.2025</a:t>
+              <a:t>28.07.2025</a:t>
             </a:fld>
             <a:endParaRPr lang="de-DE"/>
           </a:p>
@@ -2669,7 +2669,7 @@
           <a:p>
             <a:fld id="{63737C07-0EBF-4680-86B0-2C446B331173}" type="datetimeFigureOut">
               <a:rPr lang="de-DE" smtClean="0"/>
-              <a:t>04.07.2025</a:t>
+              <a:t>28.07.2025</a:t>
             </a:fld>
             <a:endParaRPr lang="de-DE"/>
           </a:p>
@@ -2910,7 +2910,7 @@
           <a:p>
             <a:fld id="{63737C07-0EBF-4680-86B0-2C446B331173}" type="datetimeFigureOut">
               <a:rPr lang="de-DE" smtClean="0"/>
-              <a:t>04.07.2025</a:t>
+              <a:t>28.07.2025</a:t>
             </a:fld>
             <a:endParaRPr lang="de-DE"/>
           </a:p>
@@ -3632,30 +3632,34 @@
               <a:lstStyle/>
               <a:p>
                 <a:r>
-                  <a:rPr lang="de-DE" sz="1600" dirty="0">
-                    <a:latin typeface="Frutiger LT Com 55 Roman" panose="020B0503030504020204" pitchFamily="34" charset="0"/>
+                  <a:rPr lang="de-DE" sz="1600" b="1" dirty="0">
+                    <a:latin typeface="Arial" panose="020B0604020202020204" pitchFamily="34" charset="0"/>
+                    <a:cs typeface="Arial" panose="020B0604020202020204" pitchFamily="34" charset="0"/>
                   </a:rPr>
                   <a:t>Applied</a:t>
                 </a:r>
               </a:p>
               <a:p>
                 <a:r>
-                  <a:rPr lang="de-DE" sz="1600" dirty="0" err="1">
-                    <a:latin typeface="Frutiger LT Com 55 Roman" panose="020B0503030504020204" pitchFamily="34" charset="0"/>
+                  <a:rPr lang="de-DE" sz="1600" b="1" dirty="0" err="1">
+                    <a:latin typeface="Arial" panose="020B0604020202020204" pitchFamily="34" charset="0"/>
+                    <a:cs typeface="Arial" panose="020B0604020202020204" pitchFamily="34" charset="0"/>
                   </a:rPr>
                   <a:t>Neurocognitive</a:t>
                 </a:r>
                 <a:r>
-                  <a:rPr lang="de-DE" sz="1600" dirty="0">
-                    <a:latin typeface="Frutiger LT Com 55 Roman" panose="020B0503030504020204" pitchFamily="34" charset="0"/>
+                  <a:rPr lang="de-DE" sz="1600" b="1" dirty="0">
+                    <a:latin typeface="Arial" panose="020B0604020202020204" pitchFamily="34" charset="0"/>
+                    <a:cs typeface="Arial" panose="020B0604020202020204" pitchFamily="34" charset="0"/>
                   </a:rPr>
                   <a:t> </a:t>
                 </a:r>
               </a:p>
               <a:p>
                 <a:r>
-                  <a:rPr lang="de-DE" sz="1600" dirty="0">
-                    <a:latin typeface="Frutiger LT Com 55 Roman" panose="020B0503030504020204" pitchFamily="34" charset="0"/>
+                  <a:rPr lang="de-DE" sz="1600" b="1" dirty="0">
+                    <a:latin typeface="Arial" panose="020B0604020202020204" pitchFamily="34" charset="0"/>
+                    <a:cs typeface="Arial" panose="020B0604020202020204" pitchFamily="34" charset="0"/>
                   </a:rPr>
                   <a:t>Systems</a:t>
                 </a:r>

</xml_diff>